<commit_message>
Auto push 2023-03-19 22:45:45.38
</commit_message>
<xml_diff>
--- a/project/project.pptx
+++ b/project/project.pptx
@@ -130,6 +130,11 @@
       </a:defRPr>
     </a:lvl9pPr>
   </p:defaultTextStyle>
+  <p:extLst>
+    <p:ext uri="{EFAFB233-063F-42B5-8137-9DF3F51BA10A}">
+      <p15:sldGuideLst xmlns:p15="http://schemas.microsoft.com/office/powerpoint/2012/main"/>
+    </p:ext>
+  </p:extLst>
 </p:presentation>
 </file>
 
@@ -215,7 +220,7 @@
           <a:p>
             <a:fld id="{EBBDB91E-178D-4A8C-A1D7-4061FC3BD69E}" type="datetimeFigureOut">
               <a:rPr lang="ko-KR" altLang="en-US" smtClean="0"/>
-              <a:t>2023-03-17</a:t>
+              <a:t>2023-03-18</a:t>
             </a:fld>
             <a:endParaRPr lang="ko-KR" altLang="en-US"/>
           </a:p>
@@ -746,7 +751,7 @@
           <a:p>
             <a:fld id="{F9686A3E-B216-48D3-965F-02F0991157CD}" type="datetimeFigureOut">
               <a:rPr lang="ko-KR" altLang="en-US" smtClean="0"/>
-              <a:t>2023-03-17</a:t>
+              <a:t>2023-03-18</a:t>
             </a:fld>
             <a:endParaRPr lang="ko-KR" altLang="en-US"/>
           </a:p>
@@ -916,7 +921,7 @@
           <a:p>
             <a:fld id="{F9686A3E-B216-48D3-965F-02F0991157CD}" type="datetimeFigureOut">
               <a:rPr lang="ko-KR" altLang="en-US" smtClean="0"/>
-              <a:t>2023-03-17</a:t>
+              <a:t>2023-03-18</a:t>
             </a:fld>
             <a:endParaRPr lang="ko-KR" altLang="en-US"/>
           </a:p>
@@ -1096,7 +1101,7 @@
           <a:p>
             <a:fld id="{F9686A3E-B216-48D3-965F-02F0991157CD}" type="datetimeFigureOut">
               <a:rPr lang="ko-KR" altLang="en-US" smtClean="0"/>
-              <a:t>2023-03-17</a:t>
+              <a:t>2023-03-18</a:t>
             </a:fld>
             <a:endParaRPr lang="ko-KR" altLang="en-US"/>
           </a:p>
@@ -1266,7 +1271,7 @@
           <a:p>
             <a:fld id="{F9686A3E-B216-48D3-965F-02F0991157CD}" type="datetimeFigureOut">
               <a:rPr lang="ko-KR" altLang="en-US" smtClean="0"/>
-              <a:t>2023-03-17</a:t>
+              <a:t>2023-03-18</a:t>
             </a:fld>
             <a:endParaRPr lang="ko-KR" altLang="en-US"/>
           </a:p>
@@ -1512,7 +1517,7 @@
           <a:p>
             <a:fld id="{F9686A3E-B216-48D3-965F-02F0991157CD}" type="datetimeFigureOut">
               <a:rPr lang="ko-KR" altLang="en-US" smtClean="0"/>
-              <a:t>2023-03-17</a:t>
+              <a:t>2023-03-18</a:t>
             </a:fld>
             <a:endParaRPr lang="ko-KR" altLang="en-US"/>
           </a:p>
@@ -1744,7 +1749,7 @@
           <a:p>
             <a:fld id="{F9686A3E-B216-48D3-965F-02F0991157CD}" type="datetimeFigureOut">
               <a:rPr lang="ko-KR" altLang="en-US" smtClean="0"/>
-              <a:t>2023-03-17</a:t>
+              <a:t>2023-03-18</a:t>
             </a:fld>
             <a:endParaRPr lang="ko-KR" altLang="en-US"/>
           </a:p>
@@ -2111,7 +2116,7 @@
           <a:p>
             <a:fld id="{F9686A3E-B216-48D3-965F-02F0991157CD}" type="datetimeFigureOut">
               <a:rPr lang="ko-KR" altLang="en-US" smtClean="0"/>
-              <a:t>2023-03-17</a:t>
+              <a:t>2023-03-18</a:t>
             </a:fld>
             <a:endParaRPr lang="ko-KR" altLang="en-US"/>
           </a:p>
@@ -2229,7 +2234,7 @@
           <a:p>
             <a:fld id="{F9686A3E-B216-48D3-965F-02F0991157CD}" type="datetimeFigureOut">
               <a:rPr lang="ko-KR" altLang="en-US" smtClean="0"/>
-              <a:t>2023-03-17</a:t>
+              <a:t>2023-03-18</a:t>
             </a:fld>
             <a:endParaRPr lang="ko-KR" altLang="en-US"/>
           </a:p>
@@ -2324,7 +2329,7 @@
           <a:p>
             <a:fld id="{F9686A3E-B216-48D3-965F-02F0991157CD}" type="datetimeFigureOut">
               <a:rPr lang="ko-KR" altLang="en-US" smtClean="0"/>
-              <a:t>2023-03-17</a:t>
+              <a:t>2023-03-18</a:t>
             </a:fld>
             <a:endParaRPr lang="ko-KR" altLang="en-US"/>
           </a:p>
@@ -2601,7 +2606,7 @@
           <a:p>
             <a:fld id="{F9686A3E-B216-48D3-965F-02F0991157CD}" type="datetimeFigureOut">
               <a:rPr lang="ko-KR" altLang="en-US" smtClean="0"/>
-              <a:t>2023-03-17</a:t>
+              <a:t>2023-03-18</a:t>
             </a:fld>
             <a:endParaRPr lang="ko-KR" altLang="en-US"/>
           </a:p>
@@ -2854,7 +2859,7 @@
           <a:p>
             <a:fld id="{F9686A3E-B216-48D3-965F-02F0991157CD}" type="datetimeFigureOut">
               <a:rPr lang="ko-KR" altLang="en-US" smtClean="0"/>
-              <a:t>2023-03-17</a:t>
+              <a:t>2023-03-18</a:t>
             </a:fld>
             <a:endParaRPr lang="ko-KR" altLang="en-US"/>
           </a:p>
@@ -3067,7 +3072,7 @@
           <a:p>
             <a:fld id="{F9686A3E-B216-48D3-965F-02F0991157CD}" type="datetimeFigureOut">
               <a:rPr lang="ko-KR" altLang="en-US" smtClean="0"/>
-              <a:t>2023-03-17</a:t>
+              <a:t>2023-03-18</a:t>
             </a:fld>
             <a:endParaRPr lang="ko-KR" altLang="en-US"/>
           </a:p>
@@ -6054,7 +6059,17 @@
                 <a:latin typeface="한컴 윤고딕 230" panose="02020603020101020101" pitchFamily="18" charset="-127"/>
                 <a:ea typeface="한컴 윤고딕 230" panose="02020603020101020101" pitchFamily="18" charset="-127"/>
               </a:rPr>
-              <a:t>기존에 운용되고 있는 </a:t>
+              <a:t>기존에 운용되고 있는 사이트를 참조하였습니다</a:t>
+            </a:r>
+            <a:r>
+              <a:rPr lang="en-US" altLang="ko-KR" sz="1867" dirty="0">
+                <a:solidFill>
+                  <a:srgbClr val="464646"/>
+                </a:solidFill>
+                <a:latin typeface="한컴 윤고딕 230" panose="02020603020101020101" pitchFamily="18" charset="-127"/>
+                <a:ea typeface="한컴 윤고딕 230" panose="02020603020101020101" pitchFamily="18" charset="-127"/>
+              </a:rPr>
+              <a:t>.(</a:t>
             </a:r>
             <a:r>
               <a:rPr lang="ko-KR" altLang="en-US" sz="1867" dirty="0">
@@ -6064,7 +6079,7 @@
                 <a:latin typeface="한컴 윤고딕 230" panose="02020603020101020101" pitchFamily="18" charset="-127"/>
                 <a:ea typeface="한컴 윤고딕 230" panose="02020603020101020101" pitchFamily="18" charset="-127"/>
               </a:rPr>
-              <a:t>사이트를 참조하였습니다</a:t>
+              <a:t>네이버 영화</a:t>
             </a:r>
             <a:r>
               <a:rPr lang="en-US" altLang="ko-KR" sz="1867" dirty="0">
@@ -6074,17 +6089,17 @@
                 <a:latin typeface="한컴 윤고딕 230" panose="02020603020101020101" pitchFamily="18" charset="-127"/>
                 <a:ea typeface="한컴 윤고딕 230" panose="02020603020101020101" pitchFamily="18" charset="-127"/>
               </a:rPr>
-              <a:t>.(</a:t>
-            </a:r>
-            <a:r>
-              <a:rPr lang="ko-KR" altLang="en-US" sz="1867" dirty="0">
+              <a:t>,IMDb,</a:t>
+            </a:r>
+            <a:r>
+              <a:rPr lang="ko-KR" altLang="en-US" sz="1867" dirty="0" err="1">
                 <a:solidFill>
                   <a:srgbClr val="464646"/>
                 </a:solidFill>
                 <a:latin typeface="한컴 윤고딕 230" panose="02020603020101020101" pitchFamily="18" charset="-127"/>
                 <a:ea typeface="한컴 윤고딕 230" panose="02020603020101020101" pitchFamily="18" charset="-127"/>
               </a:rPr>
-              <a:t>네이버 영화</a:t>
+              <a:t>로튼토마토</a:t>
             </a:r>
             <a:r>
               <a:rPr lang="en-US" altLang="ko-KR" sz="1867" dirty="0">
@@ -6094,35 +6109,8 @@
                 <a:latin typeface="한컴 윤고딕 230" panose="02020603020101020101" pitchFamily="18" charset="-127"/>
                 <a:ea typeface="한컴 윤고딕 230" panose="02020603020101020101" pitchFamily="18" charset="-127"/>
               </a:rPr>
-              <a:t>,IMDb,</a:t>
-            </a:r>
-            <a:r>
-              <a:rPr lang="ko-KR" altLang="en-US" sz="1867" dirty="0" err="1">
-                <a:solidFill>
-                  <a:srgbClr val="464646"/>
-                </a:solidFill>
-                <a:latin typeface="한컴 윤고딕 230" panose="02020603020101020101" pitchFamily="18" charset="-127"/>
-                <a:ea typeface="한컴 윤고딕 230" panose="02020603020101020101" pitchFamily="18" charset="-127"/>
-              </a:rPr>
-              <a:t>로튼토마토</a:t>
-            </a:r>
-            <a:r>
-              <a:rPr lang="en-US" altLang="ko-KR" sz="1867" dirty="0">
-                <a:solidFill>
-                  <a:srgbClr val="464646"/>
-                </a:solidFill>
-                <a:latin typeface="한컴 윤고딕 230" panose="02020603020101020101" pitchFamily="18" charset="-127"/>
-                <a:ea typeface="한컴 윤고딕 230" panose="02020603020101020101" pitchFamily="18" charset="-127"/>
-              </a:rPr>
               <a:t>)</a:t>
             </a:r>
-            <a:endParaRPr lang="en-US" altLang="ko-KR" sz="1867" dirty="0">
-              <a:solidFill>
-                <a:srgbClr val="464646"/>
-              </a:solidFill>
-              <a:latin typeface="한컴 윤고딕 230" panose="02020603020101020101" pitchFamily="18" charset="-127"/>
-              <a:ea typeface="한컴 윤고딕 230" panose="02020603020101020101" pitchFamily="18" charset="-127"/>
-            </a:endParaRPr>
           </a:p>
           <a:p>
             <a:endParaRPr lang="ko-KR" altLang="en-US" sz="1867" dirty="0">

</xml_diff>